<commit_message>
update .mycshrc and AXI presentation
</commit_message>
<xml_diff>
--- a/AXI_present.pptx
+++ b/AXI_present.pptx
@@ -117,7 +117,7 @@
   </p:defaultTextStyle>
   <p:extLst>
     <p:ext uri="{EFAFB233-063F-42B5-8137-9DF3F51BA10A}">
-      <p15:sldGuideLst xmlns:p15="http://schemas.microsoft.com/office/powerpoint/2012/main"/>
+      <p15:sldGuideLst xmlns:p15="http://schemas.microsoft.com/office/powerpoint/2012/main" xmlns=""/>
     </p:ext>
   </p:extLst>
 </p:presentation>
@@ -205,7 +205,7 @@
           <a:p>
             <a:fld id="{4E93E8C2-42AD-43C6-A441-B2C64C5796BB}" type="datetimeFigureOut">
               <a:rPr lang="en-US" smtClean="0"/>
-              <a:t>5/11/2018</a:t>
+              <a:t>5/13/2018</a:t>
             </a:fld>
             <a:endParaRPr lang="en-US"/>
           </a:p>
@@ -4277,14 +4277,14 @@
               <a:buNone/>
             </a:pPr>
             <a:r>
-              <a:rPr lang="en-GB" altLang="en-US" sz="4000" smtClean="0">
+              <a:rPr lang="en-GB" altLang="en-US" sz="4000" dirty="0" smtClean="0">
                 <a:latin typeface="+mn-lt"/>
                 <a:cs typeface="Arial" panose="020B0604020202020204" pitchFamily="34" charset="0"/>
               </a:rPr>
               <a:t>AXI </a:t>
             </a:r>
             <a:r>
-              <a:rPr lang="en-GB" altLang="en-US" sz="4000">
+              <a:rPr lang="en-GB" altLang="en-US" sz="4000" dirty="0">
                 <a:latin typeface="+mn-lt"/>
                 <a:cs typeface="Arial" panose="020B0604020202020204" pitchFamily="34" charset="0"/>
               </a:rPr>
@@ -4329,14 +4329,7 @@
                 <a:latin typeface="+mn-lt"/>
                 <a:cs typeface="Arial" panose="020B0604020202020204" pitchFamily="34" charset="0"/>
               </a:rPr>
-              <a:t>Nguyen Cong Huan, </a:t>
-            </a:r>
-            <a:r>
-              <a:rPr lang="en-US" sz="2200" b="1" smtClean="0">
-                <a:latin typeface="+mn-lt"/>
-                <a:cs typeface="Arial" panose="020B0604020202020204" pitchFamily="34" charset="0"/>
-              </a:rPr>
-              <a:t>OA-ICT</a:t>
+              <a:t>Nguyen Cong Huan, OA-ICT</a:t>
             </a:r>
           </a:p>
           <a:p>
@@ -4350,10 +4343,6 @@
               </a:rPr>
               <a:t>Tran Vu Thuyet, OA-ICT</a:t>
             </a:r>
-            <a:endParaRPr lang="en-US" sz="2200" b="1" smtClean="0">
-              <a:latin typeface="+mn-lt"/>
-              <a:cs typeface="Arial" panose="020B0604020202020204" pitchFamily="34" charset="0"/>
-            </a:endParaRPr>
           </a:p>
           <a:p>
             <a:pPr marL="0" indent="0">
@@ -4648,9 +4637,6 @@
               </a:rPr>
               <a:t>Easy addition to register stages to provide timing closure</a:t>
             </a:r>
-            <a:endParaRPr lang="en-US" smtClean="0">
-              <a:cs typeface="Arial" panose="020B0604020202020204" pitchFamily="34" charset="0"/>
-            </a:endParaRPr>
           </a:p>
           <a:p>
             <a:pPr marL="285750" indent="-285750">
@@ -4677,6 +4663,13 @@
   <p:clrMapOvr>
     <a:masterClrMapping/>
   </p:clrMapOvr>
+  <p:timing>
+    <p:tnLst>
+      <p:par>
+        <p:cTn id="1" dur="indefinite" restart="never" nodeType="tmRoot"/>
+      </p:par>
+    </p:tnLst>
+  </p:timing>
 </p:sld>
 </file>
 
@@ -4791,14 +4784,14 @@
           <p:nvPr>
             <p:extLst>
               <p:ext uri="{D42A27DB-BD31-4B8C-83A1-F6EECF244321}">
-                <p14:modId xmlns:p14="http://schemas.microsoft.com/office/powerpoint/2010/main" val="200584940"/>
+                <p14:modId xmlns:p14="http://schemas.microsoft.com/office/powerpoint/2010/main" val="4268305089"/>
               </p:ext>
             </p:extLst>
           </p:nvPr>
         </p:nvGraphicFramePr>
         <p:xfrm>
           <a:off x="1132764" y="2041776"/>
-          <a:ext cx="9663562" cy="3321954"/>
+          <a:ext cx="10044752" cy="3408375"/>
         </p:xfrm>
         <a:graphic>
           <a:graphicData uri="http://schemas.openxmlformats.org/drawingml/2006/table">
@@ -4807,11 +4800,11 @@
                 <a:tableStyleId>{5C22544A-7EE6-4342-B048-85BDC9FD1C3A}</a:tableStyleId>
               </a:tblPr>
               <a:tblGrid>
-                <a:gridCol w="1072051"/>
-                <a:gridCol w="1643854"/>
-                <a:gridCol w="1733265"/>
-                <a:gridCol w="1091821"/>
-                <a:gridCol w="4122571"/>
+                <a:gridCol w="1114339"/>
+                <a:gridCol w="1708698"/>
+                <a:gridCol w="1801636"/>
+                <a:gridCol w="1134889"/>
+                <a:gridCol w="4285190"/>
               </a:tblGrid>
               <a:tr h="553659">
                 <a:tc>
@@ -4821,10 +4814,10 @@
                     <a:p>
                       <a:pPr algn="ctr"/>
                       <a:r>
-                        <a:rPr lang="en-US" smtClean="0"/>
+                        <a:rPr lang="en-US" dirty="0" smtClean="0"/>
                         <a:t>No</a:t>
                       </a:r>
-                      <a:endParaRPr lang="en-US"/>
+                      <a:endParaRPr lang="en-US" dirty="0"/>
                     </a:p>
                   </a:txBody>
                   <a:tcPr anchor="ctr"/>
@@ -4983,7 +4976,7 @@
                     <a:bodyPr/>
                     <a:lstStyle/>
                     <a:p>
-                      <a:endParaRPr lang="en-US"/>
+                      <a:endParaRPr lang="en-US" dirty="0"/>
                     </a:p>
                   </a:txBody>
                   <a:tcPr anchor="ctr">
@@ -5081,7 +5074,7 @@
                     <a:bodyPr/>
                     <a:lstStyle/>
                     <a:p>
-                      <a:endParaRPr lang="en-US"/>
+                      <a:endParaRPr lang="en-US" dirty="0"/>
                     </a:p>
                   </a:txBody>
                   <a:tcPr anchor="ctr">
@@ -5187,7 +5180,15 @@
                     <a:bodyPr/>
                     <a:lstStyle/>
                     <a:p>
-                      <a:endParaRPr lang="en-US"/>
+                      <a:r>
+                        <a:rPr lang="en-US" dirty="0" smtClean="0"/>
+                        <a:t>Channel for passing all writing</a:t>
+                      </a:r>
+                      <a:r>
+                        <a:rPr lang="en-US" baseline="0" dirty="0" smtClean="0"/>
+                        <a:t> data info</a:t>
+                      </a:r>
+                      <a:endParaRPr lang="en-US" dirty="0"/>
                     </a:p>
                   </a:txBody>
                   <a:tcPr anchor="ctr">
@@ -5285,7 +5286,31 @@
                     <a:bodyPr/>
                     <a:lstStyle/>
                     <a:p>
-                      <a:endParaRPr lang="en-US"/>
+                      <a:r>
+                        <a:rPr lang="en-US" dirty="0" smtClean="0"/>
+                        <a:t>Response for</a:t>
+                      </a:r>
+                      <a:r>
+                        <a:rPr lang="en-US" baseline="0" dirty="0" smtClean="0"/>
+                        <a:t> writing </a:t>
+                      </a:r>
+                      <a:r>
+                        <a:rPr lang="en-US" dirty="0" smtClean="0"/>
+                        <a:t>from Slave</a:t>
+                      </a:r>
+                      <a:r>
+                        <a:rPr lang="en-US" baseline="0" dirty="0" smtClean="0"/>
+                        <a:t> to </a:t>
+                      </a:r>
+                      <a:r>
+                        <a:rPr lang="en-US" baseline="0" dirty="0" err="1" smtClean="0"/>
+                        <a:t>to</a:t>
+                      </a:r>
+                      <a:r>
+                        <a:rPr lang="en-US" baseline="0" dirty="0" smtClean="0"/>
+                        <a:t> Master </a:t>
+                      </a:r>
+                      <a:endParaRPr lang="en-US" dirty="0"/>
                     </a:p>
                   </a:txBody>
                   <a:tcPr anchor="ctr">
@@ -5379,7 +5404,11 @@
                     <a:bodyPr/>
                     <a:lstStyle/>
                     <a:p>
-                      <a:endParaRPr lang="en-US"/>
+                      <a:r>
+                        <a:rPr lang="en-US" dirty="0" smtClean="0"/>
+                        <a:t>Channel for passing all reading data info</a:t>
+                      </a:r>
+                      <a:endParaRPr lang="en-US" dirty="0"/>
                     </a:p>
                   </a:txBody>
                   <a:tcPr anchor="ctr">
@@ -5406,6 +5435,13 @@
   <p:clrMapOvr>
     <a:masterClrMapping/>
   </p:clrMapOvr>
+  <p:timing>
+    <p:tnLst>
+      <p:par>
+        <p:cTn id="1" dur="indefinite" restart="never" nodeType="tmRoot"/>
+      </p:par>
+    </p:tnLst>
+  </p:timing>
 </p:sld>
 </file>
 
@@ -5517,6 +5553,13 @@
   <p:clrMapOvr>
     <a:masterClrMapping/>
   </p:clrMapOvr>
+  <p:timing>
+    <p:tnLst>
+      <p:par>
+        <p:cTn id="1" dur="indefinite" restart="never" nodeType="tmRoot"/>
+      </p:par>
+    </p:tnLst>
+  </p:timing>
 </p:sld>
 </file>
 
@@ -5628,6 +5671,13 @@
   <p:clrMapOvr>
     <a:masterClrMapping/>
   </p:clrMapOvr>
+  <p:timing>
+    <p:tnLst>
+      <p:par>
+        <p:cTn id="1" dur="indefinite" restart="never" nodeType="tmRoot"/>
+      </p:par>
+    </p:tnLst>
+  </p:timing>
 </p:sld>
 </file>
 
@@ -5739,6 +5789,13 @@
   <p:clrMapOvr>
     <a:masterClrMapping/>
   </p:clrMapOvr>
+  <p:timing>
+    <p:tnLst>
+      <p:par>
+        <p:cTn id="1" dur="indefinite" restart="never" nodeType="tmRoot"/>
+      </p:par>
+    </p:tnLst>
+  </p:timing>
 </p:sld>
 </file>
 
@@ -6090,10 +6147,10 @@
           <a:p>
             <a:pPr algn="ctr"/>
             <a:r>
-              <a:rPr lang="en-US" smtClean="0"/>
-              <a:t>Address/Control phase</a:t>
-            </a:r>
-            <a:endParaRPr lang="en-US"/>
+              <a:rPr lang="en-US" dirty="0" smtClean="0"/>
+              <a:t>Data phase</a:t>
+            </a:r>
+            <a:endParaRPr lang="en-US" dirty="0"/>
           </a:p>
         </p:txBody>
       </p:sp>
@@ -6107,6 +6164,13 @@
   <p:clrMapOvr>
     <a:masterClrMapping/>
   </p:clrMapOvr>
+  <p:timing>
+    <p:tnLst>
+      <p:par>
+        <p:cTn id="1" dur="indefinite" restart="never" nodeType="tmRoot"/>
+      </p:par>
+    </p:tnLst>
+  </p:timing>
 </p:sld>
 </file>
 
@@ -6344,6 +6408,13 @@
   <p:clrMapOvr>
     <a:masterClrMapping/>
   </p:clrMapOvr>
+  <p:timing>
+    <p:tnLst>
+      <p:par>
+        <p:cTn id="1" dur="indefinite" restart="never" nodeType="tmRoot"/>
+      </p:par>
+    </p:tnLst>
+  </p:timing>
 </p:sld>
 </file>
 
@@ -6451,6 +6522,13 @@
   <p:clrMapOvr>
     <a:masterClrMapping/>
   </p:clrMapOvr>
+  <p:timing>
+    <p:tnLst>
+      <p:par>
+        <p:cTn id="1" dur="indefinite" restart="never" nodeType="tmRoot"/>
+      </p:par>
+    </p:tnLst>
+  </p:timing>
 </p:sld>
 </file>
 
@@ -6709,7 +6787,7 @@
   <a:extraClrSchemeLst/>
   <a:extLst>
     <a:ext uri="{05A4C25C-085E-4340-85A3-A5531E510DB2}">
-      <thm15:themeFamily xmlns:thm15="http://schemas.microsoft.com/office/thememl/2012/main" name="Office Theme" id="{62F939B6-93AF-4DB8-9C6B-D6C7DFDC589F}" vid="{4A3C46E8-61CC-4603-A589-7422A47A8E4A}"/>
+      <thm15:themeFamily xmlns:thm15="http://schemas.microsoft.com/office/thememl/2012/main" xmlns="" name="Office Theme" id="{62F939B6-93AF-4DB8-9C6B-D6C7DFDC589F}" vid="{4A3C46E8-61CC-4603-A589-7422A47A8E4A}"/>
     </a:ext>
   </a:extLst>
 </a:theme>
@@ -6970,7 +7048,7 @@
   <a:extraClrSchemeLst/>
   <a:extLst>
     <a:ext uri="{05A4C25C-085E-4340-85A3-A5531E510DB2}">
-      <thm15:themeFamily xmlns:thm15="http://schemas.microsoft.com/office/thememl/2012/main" name="Office Theme" id="{62F939B6-93AF-4DB8-9C6B-D6C7DFDC589F}" vid="{4A3C46E8-61CC-4603-A589-7422A47A8E4A}"/>
+      <thm15:themeFamily xmlns:thm15="http://schemas.microsoft.com/office/thememl/2012/main" xmlns="" name="Office Theme" id="{62F939B6-93AF-4DB8-9C6B-D6C7DFDC589F}" vid="{4A3C46E8-61CC-4603-A589-7422A47A8E4A}"/>
     </a:ext>
   </a:extLst>
 </a:theme>

</xml_diff>